<commit_message>
FirstTeensyAudio: update lead figure
</commit_message>
<xml_diff>
--- a/2016-10-23 First Teensy Audio/Figures for Blog/Figures.pptx
+++ b/2016-10-23 First Teensy Audio/Figures for Blog/Figures.pptx
@@ -3496,209 +3496,6 @@
             </a:custGeom>
             <a:noFill/>
             <a:ln w="57150">
-              <a:solidFill>
-                <a:srgbClr val="FFFF00"/>
-              </a:solidFill>
-              <a:headEnd type="none" w="med" len="med"/>
-              <a:tailEnd type="triangle" w="med" len="med"/>
-            </a:ln>
-          </p:spPr>
-          <p:style>
-            <a:lnRef idx="2">
-              <a:schemeClr val="accent1">
-                <a:shade val="50000"/>
-              </a:schemeClr>
-            </a:lnRef>
-            <a:fillRef idx="1">
-              <a:schemeClr val="accent1"/>
-            </a:fillRef>
-            <a:effectRef idx="0">
-              <a:schemeClr val="accent1"/>
-            </a:effectRef>
-            <a:fontRef idx="minor">
-              <a:schemeClr val="lt1"/>
-            </a:fontRef>
-          </p:style>
-          <p:txBody>
-            <a:bodyPr rtlCol="0" anchor="ctr"/>
-            <a:lstStyle/>
-            <a:p>
-              <a:pPr algn="ctr"/>
-              <a:endParaRPr lang="en-US"/>
-            </a:p>
-          </p:txBody>
-        </p:sp>
-        <p:sp>
-          <p:nvSpPr>
-            <p:cNvPr id="10" name="TextBox 9"/>
-            <p:cNvSpPr txBox="1"/>
-            <p:nvPr/>
-          </p:nvSpPr>
-          <p:spPr>
-            <a:xfrm>
-              <a:off x="3089840" y="4183544"/>
-              <a:ext cx="1524000" cy="523220"/>
-            </a:xfrm>
-            <a:prstGeom prst="rect">
-              <a:avLst/>
-            </a:prstGeom>
-            <a:noFill/>
-          </p:spPr>
-          <p:txBody>
-            <a:bodyPr wrap="square" lIns="45720" rIns="45720" rtlCol="0">
-              <a:spAutoFit/>
-            </a:bodyPr>
-            <a:lstStyle/>
-            <a:p>
-              <a:pPr algn="ctr"/>
-              <a:r>
-                <a:rPr lang="en-US" sz="1400" b="1" dirty="0" smtClean="0">
-                  <a:solidFill>
-                    <a:srgbClr val="FFFF00"/>
-                  </a:solidFill>
-                  <a:effectLst>
-                    <a:outerShdw blurRad="38100" dist="38100" dir="2700000" algn="tl">
-                      <a:srgbClr val="000000">
-                        <a:alpha val="43137"/>
-                      </a:srgbClr>
-                    </a:outerShdw>
-                  </a:effectLst>
-                </a:rPr>
-                <a:t>I Added This</a:t>
-              </a:r>
-            </a:p>
-            <a:p>
-              <a:pPr algn="ctr"/>
-              <a:r>
-                <a:rPr lang="en-US" sz="1400" b="1" dirty="0" smtClean="0">
-                  <a:solidFill>
-                    <a:srgbClr val="FFFF00"/>
-                  </a:solidFill>
-                  <a:effectLst>
-                    <a:outerShdw blurRad="38100" dist="38100" dir="2700000" algn="tl">
-                      <a:srgbClr val="000000">
-                        <a:alpha val="43137"/>
-                      </a:srgbClr>
-                    </a:outerShdw>
-                  </a:effectLst>
-                </a:rPr>
-                <a:t>Line-In Jack</a:t>
-              </a:r>
-              <a:endParaRPr lang="en-US" sz="1400" b="1" dirty="0">
-                <a:solidFill>
-                  <a:srgbClr val="FFFF00"/>
-                </a:solidFill>
-                <a:effectLst>
-                  <a:outerShdw blurRad="38100" dist="38100" dir="2700000" algn="tl">
-                    <a:srgbClr val="000000">
-                      <a:alpha val="43137"/>
-                    </a:srgbClr>
-                  </a:outerShdw>
-                </a:effectLst>
-              </a:endParaRPr>
-            </a:p>
-          </p:txBody>
-        </p:sp>
-        <p:sp>
-          <p:nvSpPr>
-            <p:cNvPr id="11" name="Freeform 10"/>
-            <p:cNvSpPr/>
-            <p:nvPr/>
-          </p:nvSpPr>
-          <p:spPr>
-            <a:xfrm rot="10524560" flipH="1">
-              <a:off x="4420816" y="4127521"/>
-              <a:ext cx="522103" cy="297139"/>
-            </a:xfrm>
-            <a:custGeom>
-              <a:avLst/>
-              <a:gdLst>
-                <a:gd name="connsiteX0" fmla="*/ 0 w 580913"/>
-                <a:gd name="connsiteY0" fmla="*/ 0 h 344245"/>
-                <a:gd name="connsiteX1" fmla="*/ 580913 w 580913"/>
-                <a:gd name="connsiteY1" fmla="*/ 344245 h 344245"/>
-                <a:gd name="connsiteX0" fmla="*/ 0 w 580913"/>
-                <a:gd name="connsiteY0" fmla="*/ 0 h 344245"/>
-                <a:gd name="connsiteX1" fmla="*/ 387276 w 580913"/>
-                <a:gd name="connsiteY1" fmla="*/ 32273 h 344245"/>
-                <a:gd name="connsiteX2" fmla="*/ 580913 w 580913"/>
-                <a:gd name="connsiteY2" fmla="*/ 344245 h 344245"/>
-                <a:gd name="connsiteX0" fmla="*/ 0 w 580913"/>
-                <a:gd name="connsiteY0" fmla="*/ 444 h 344689"/>
-                <a:gd name="connsiteX1" fmla="*/ 387276 w 580913"/>
-                <a:gd name="connsiteY1" fmla="*/ 32717 h 344689"/>
-                <a:gd name="connsiteX2" fmla="*/ 580913 w 580913"/>
-                <a:gd name="connsiteY2" fmla="*/ 344689 h 344689"/>
-                <a:gd name="connsiteX0" fmla="*/ 0 w 580913"/>
-                <a:gd name="connsiteY0" fmla="*/ 22963 h 367208"/>
-                <a:gd name="connsiteX1" fmla="*/ 387276 w 580913"/>
-                <a:gd name="connsiteY1" fmla="*/ 55236 h 367208"/>
-                <a:gd name="connsiteX2" fmla="*/ 580913 w 580913"/>
-                <a:gd name="connsiteY2" fmla="*/ 367208 h 367208"/>
-                <a:gd name="connsiteX0" fmla="*/ 0 w 580913"/>
-                <a:gd name="connsiteY0" fmla="*/ 16908 h 361153"/>
-                <a:gd name="connsiteX1" fmla="*/ 387276 w 580913"/>
-                <a:gd name="connsiteY1" fmla="*/ 49181 h 361153"/>
-                <a:gd name="connsiteX2" fmla="*/ 580913 w 580913"/>
-                <a:gd name="connsiteY2" fmla="*/ 361153 h 361153"/>
-                <a:gd name="connsiteX0" fmla="*/ 0 w 561863"/>
-                <a:gd name="connsiteY0" fmla="*/ 0 h 444258"/>
-                <a:gd name="connsiteX1" fmla="*/ 368226 w 561863"/>
-                <a:gd name="connsiteY1" fmla="*/ 132286 h 444258"/>
-                <a:gd name="connsiteX2" fmla="*/ 561863 w 561863"/>
-                <a:gd name="connsiteY2" fmla="*/ 444258 h 444258"/>
-                <a:gd name="connsiteX0" fmla="*/ 0 w 561863"/>
-                <a:gd name="connsiteY0" fmla="*/ 0 h 444258"/>
-                <a:gd name="connsiteX1" fmla="*/ 368226 w 561863"/>
-                <a:gd name="connsiteY1" fmla="*/ 132286 h 444258"/>
-                <a:gd name="connsiteX2" fmla="*/ 561863 w 561863"/>
-                <a:gd name="connsiteY2" fmla="*/ 444258 h 444258"/>
-                <a:gd name="connsiteX0" fmla="*/ 0 w 561863"/>
-                <a:gd name="connsiteY0" fmla="*/ 0 h 444258"/>
-                <a:gd name="connsiteX1" fmla="*/ 363655 w 561863"/>
-                <a:gd name="connsiteY1" fmla="*/ 81486 h 444258"/>
-                <a:gd name="connsiteX2" fmla="*/ 561863 w 561863"/>
-                <a:gd name="connsiteY2" fmla="*/ 444258 h 444258"/>
-                <a:gd name="connsiteX0" fmla="*/ 0 w 561863"/>
-                <a:gd name="connsiteY0" fmla="*/ 0 h 444258"/>
-                <a:gd name="connsiteX1" fmla="*/ 363655 w 561863"/>
-                <a:gd name="connsiteY1" fmla="*/ 81486 h 444258"/>
-                <a:gd name="connsiteX2" fmla="*/ 561863 w 561863"/>
-                <a:gd name="connsiteY2" fmla="*/ 444258 h 444258"/>
-              </a:gdLst>
-              <a:ahLst/>
-              <a:cxnLst>
-                <a:cxn ang="0">
-                  <a:pos x="connsiteX0" y="connsiteY0"/>
-                </a:cxn>
-                <a:cxn ang="0">
-                  <a:pos x="connsiteX1" y="connsiteY1"/>
-                </a:cxn>
-                <a:cxn ang="0">
-                  <a:pos x="connsiteX2" y="connsiteY2"/>
-                </a:cxn>
-              </a:cxnLst>
-              <a:rect l="l" t="t" r="r" b="b"/>
-              <a:pathLst>
-                <a:path w="561863" h="444258">
-                  <a:moveTo>
-                    <a:pt x="0" y="0"/>
-                  </a:moveTo>
-                  <a:cubicBezTo>
-                    <a:pt x="188371" y="3753"/>
-                    <a:pt x="290579" y="26493"/>
-                    <a:pt x="363655" y="81486"/>
-                  </a:cubicBezTo>
-                  <a:cubicBezTo>
-                    <a:pt x="436731" y="136479"/>
-                    <a:pt x="497317" y="216442"/>
-                    <a:pt x="561863" y="444258"/>
-                  </a:cubicBezTo>
-                </a:path>
-              </a:pathLst>
-            </a:custGeom>
-            <a:noFill/>
-            <a:ln w="28575">
               <a:solidFill>
                 <a:srgbClr val="FFFF00"/>
               </a:solidFill>

</xml_diff>